<commit_message>
updated week 6 distributions
</commit_message>
<xml_diff>
--- a/lectures/week_5_tests/le_5_tests.pptx
+++ b/lectures/week_5_tests/le_5_tests.pptx
@@ -231,7 +231,7 @@
           <a:p>
             <a:fld id="{6EBC5869-D15C-3840-B050-90A5C35E6518}" type="datetimeFigureOut">
               <a:rPr lang="en-US" smtClean="0"/>
-              <a:t>2/16/21</a:t>
+              <a:t>2/23/21</a:t>
             </a:fld>
             <a:endParaRPr lang="en-US"/>
           </a:p>
@@ -1159,7 +1159,7 @@
           <a:p>
             <a:fld id="{7D5693D1-C5E8-7D40-8B0E-476CF8AD55E4}" type="datetimeFigureOut">
               <a:rPr lang="en-US" smtClean="0"/>
-              <a:t>2/16/21</a:t>
+              <a:t>2/23/21</a:t>
             </a:fld>
             <a:endParaRPr lang="en-US"/>
           </a:p>
@@ -1327,7 +1327,7 @@
           <a:p>
             <a:fld id="{7D5693D1-C5E8-7D40-8B0E-476CF8AD55E4}" type="datetimeFigureOut">
               <a:rPr lang="en-US" smtClean="0"/>
-              <a:t>2/16/21</a:t>
+              <a:t>2/23/21</a:t>
             </a:fld>
             <a:endParaRPr lang="en-US"/>
           </a:p>
@@ -1505,7 +1505,7 @@
           <a:p>
             <a:fld id="{7D5693D1-C5E8-7D40-8B0E-476CF8AD55E4}" type="datetimeFigureOut">
               <a:rPr lang="en-US" smtClean="0"/>
-              <a:t>2/16/21</a:t>
+              <a:t>2/23/21</a:t>
             </a:fld>
             <a:endParaRPr lang="en-US"/>
           </a:p>
@@ -1673,7 +1673,7 @@
           <a:p>
             <a:fld id="{7D5693D1-C5E8-7D40-8B0E-476CF8AD55E4}" type="datetimeFigureOut">
               <a:rPr lang="en-US" smtClean="0"/>
-              <a:t>2/16/21</a:t>
+              <a:t>2/23/21</a:t>
             </a:fld>
             <a:endParaRPr lang="en-US"/>
           </a:p>
@@ -1918,7 +1918,7 @@
           <a:p>
             <a:fld id="{7D5693D1-C5E8-7D40-8B0E-476CF8AD55E4}" type="datetimeFigureOut">
               <a:rPr lang="en-US" smtClean="0"/>
-              <a:t>2/16/21</a:t>
+              <a:t>2/23/21</a:t>
             </a:fld>
             <a:endParaRPr lang="en-US"/>
           </a:p>
@@ -2147,7 +2147,7 @@
           <a:p>
             <a:fld id="{7D5693D1-C5E8-7D40-8B0E-476CF8AD55E4}" type="datetimeFigureOut">
               <a:rPr lang="en-US" smtClean="0"/>
-              <a:t>2/16/21</a:t>
+              <a:t>2/23/21</a:t>
             </a:fld>
             <a:endParaRPr lang="en-US"/>
           </a:p>
@@ -2511,7 +2511,7 @@
           <a:p>
             <a:fld id="{7D5693D1-C5E8-7D40-8B0E-476CF8AD55E4}" type="datetimeFigureOut">
               <a:rPr lang="en-US" smtClean="0"/>
-              <a:t>2/16/21</a:t>
+              <a:t>2/23/21</a:t>
             </a:fld>
             <a:endParaRPr lang="en-US"/>
           </a:p>
@@ -2628,7 +2628,7 @@
           <a:p>
             <a:fld id="{7D5693D1-C5E8-7D40-8B0E-476CF8AD55E4}" type="datetimeFigureOut">
               <a:rPr lang="en-US" smtClean="0"/>
-              <a:t>2/16/21</a:t>
+              <a:t>2/23/21</a:t>
             </a:fld>
             <a:endParaRPr lang="en-US"/>
           </a:p>
@@ -2723,7 +2723,7 @@
           <a:p>
             <a:fld id="{7D5693D1-C5E8-7D40-8B0E-476CF8AD55E4}" type="datetimeFigureOut">
               <a:rPr lang="en-US" smtClean="0"/>
-              <a:t>2/16/21</a:t>
+              <a:t>2/23/21</a:t>
             </a:fld>
             <a:endParaRPr lang="en-US"/>
           </a:p>
@@ -2998,7 +2998,7 @@
           <a:p>
             <a:fld id="{7D5693D1-C5E8-7D40-8B0E-476CF8AD55E4}" type="datetimeFigureOut">
               <a:rPr lang="en-US" smtClean="0"/>
-              <a:t>2/16/21</a:t>
+              <a:t>2/23/21</a:t>
             </a:fld>
             <a:endParaRPr lang="en-US"/>
           </a:p>
@@ -3250,7 +3250,7 @@
           <a:p>
             <a:fld id="{7D5693D1-C5E8-7D40-8B0E-476CF8AD55E4}" type="datetimeFigureOut">
               <a:rPr lang="en-US" smtClean="0"/>
-              <a:t>2/16/21</a:t>
+              <a:t>2/23/21</a:t>
             </a:fld>
             <a:endParaRPr lang="en-US"/>
           </a:p>
@@ -3461,7 +3461,7 @@
           <a:p>
             <a:fld id="{7D5693D1-C5E8-7D40-8B0E-476CF8AD55E4}" type="datetimeFigureOut">
               <a:rPr lang="en-US" smtClean="0"/>
-              <a:t>2/16/21</a:t>
+              <a:t>2/23/21</a:t>
             </a:fld>
             <a:endParaRPr lang="en-US"/>
           </a:p>
@@ -5228,7 +5228,7 @@
         <p:spPr/>
         <p:txBody>
           <a:bodyPr>
-            <a:normAutofit fontScale="92500"/>
+            <a:normAutofit fontScale="92500" lnSpcReduction="10000"/>
           </a:bodyPr>
           <a:lstStyle/>
           <a:p>
@@ -5302,17 +5302,17 @@
             </a:r>
           </a:p>
           <a:p>
-            <a:pPr lvl="3"/>
-            <a:r>
-              <a:rPr lang="en-US" dirty="0"/>
-              <a:t>There will be a short quiz activity on canvas</a:t>
-            </a:r>
-          </a:p>
-          <a:p>
             <a:pPr lvl="2"/>
             <a:r>
               <a:rPr lang="en-US" dirty="0"/>
-              <a:t>2) </a:t>
+              <a:t>2) Take quiz (after reading chapter, open book)</a:t>
+            </a:r>
+          </a:p>
+          <a:p>
+            <a:pPr lvl="2"/>
+            <a:r>
+              <a:rPr lang="en-US" dirty="0"/>
+              <a:t>3) Read </a:t>
             </a:r>
             <a:r>
               <a:rPr lang="en-US" dirty="0" err="1"/>
@@ -5342,14 +5342,22 @@
             </a:r>
             <a:r>
               <a:rPr lang="en-US" dirty="0"/>
-              <a:t>: recorded lecture, we will not meet in person; we will meet on Thurs</a:t>
+              <a:t>: recorded lecture, we will </a:t>
+            </a:r>
+            <a:r>
+              <a:rPr lang="en-US" b="1" dirty="0"/>
+              <a:t>not</a:t>
+            </a:r>
+            <a:r>
+              <a:rPr lang="en-US" dirty="0"/>
+              <a:t> meet in person</a:t>
             </a:r>
           </a:p>
           <a:p>
             <a:pPr lvl="1"/>
             <a:r>
               <a:rPr lang="en-US" dirty="0"/>
-              <a:t>Tuesday Mar 16</a:t>
+              <a:t>Thurs Mar 11</a:t>
             </a:r>
             <a:r>
               <a:rPr lang="en-US" baseline="30000" dirty="0"/>
@@ -5357,7 +5365,37 @@
             </a:r>
             <a:r>
               <a:rPr lang="en-US" dirty="0"/>
-              <a:t>: most likely will record this lecture, but be on during class time for q’s and office hours</a:t>
+              <a:t>: Meet as usual </a:t>
+            </a:r>
+          </a:p>
+          <a:p>
+            <a:pPr lvl="1"/>
+            <a:r>
+              <a:rPr lang="en-US" dirty="0"/>
+              <a:t>Tuesday Mar 16</a:t>
+            </a:r>
+            <a:r>
+              <a:rPr lang="en-US" baseline="30000" dirty="0"/>
+              <a:t>th</a:t>
+            </a:r>
+            <a:r>
+              <a:rPr lang="en-US" dirty="0"/>
+              <a:t>: recorded lecture, will be on for office hours TBA</a:t>
+            </a:r>
+          </a:p>
+          <a:p>
+            <a:pPr lvl="1"/>
+            <a:r>
+              <a:rPr lang="en-US" dirty="0"/>
+              <a:t>Thurs Mar 18</a:t>
+            </a:r>
+            <a:r>
+              <a:rPr lang="en-US" baseline="30000" dirty="0"/>
+              <a:t>th</a:t>
+            </a:r>
+            <a:r>
+              <a:rPr lang="en-US" dirty="0"/>
+              <a:t>: meet at usual</a:t>
             </a:r>
             <a:br>
               <a:rPr lang="en-US" b="1" u="sng" dirty="0"/>

</xml_diff>

<commit_message>
lecture updates week 5
</commit_message>
<xml_diff>
--- a/lectures/week_5_tests/le_5_tests.pptx
+++ b/lectures/week_5_tests/le_5_tests.pptx
@@ -231,7 +231,7 @@
           <a:p>
             <a:fld id="{6EBC5869-D15C-3840-B050-90A5C35E6518}" type="datetimeFigureOut">
               <a:rPr lang="en-US" smtClean="0"/>
-              <a:t>2/23/21</a:t>
+              <a:t>2/15/22</a:t>
             </a:fld>
             <a:endParaRPr lang="en-US"/>
           </a:p>
@@ -1159,7 +1159,7 @@
           <a:p>
             <a:fld id="{7D5693D1-C5E8-7D40-8B0E-476CF8AD55E4}" type="datetimeFigureOut">
               <a:rPr lang="en-US" smtClean="0"/>
-              <a:t>2/23/21</a:t>
+              <a:t>2/15/22</a:t>
             </a:fld>
             <a:endParaRPr lang="en-US"/>
           </a:p>
@@ -1327,7 +1327,7 @@
           <a:p>
             <a:fld id="{7D5693D1-C5E8-7D40-8B0E-476CF8AD55E4}" type="datetimeFigureOut">
               <a:rPr lang="en-US" smtClean="0"/>
-              <a:t>2/23/21</a:t>
+              <a:t>2/15/22</a:t>
             </a:fld>
             <a:endParaRPr lang="en-US"/>
           </a:p>
@@ -1505,7 +1505,7 @@
           <a:p>
             <a:fld id="{7D5693D1-C5E8-7D40-8B0E-476CF8AD55E4}" type="datetimeFigureOut">
               <a:rPr lang="en-US" smtClean="0"/>
-              <a:t>2/23/21</a:t>
+              <a:t>2/15/22</a:t>
             </a:fld>
             <a:endParaRPr lang="en-US"/>
           </a:p>
@@ -1673,7 +1673,7 @@
           <a:p>
             <a:fld id="{7D5693D1-C5E8-7D40-8B0E-476CF8AD55E4}" type="datetimeFigureOut">
               <a:rPr lang="en-US" smtClean="0"/>
-              <a:t>2/23/21</a:t>
+              <a:t>2/15/22</a:t>
             </a:fld>
             <a:endParaRPr lang="en-US"/>
           </a:p>
@@ -1918,7 +1918,7 @@
           <a:p>
             <a:fld id="{7D5693D1-C5E8-7D40-8B0E-476CF8AD55E4}" type="datetimeFigureOut">
               <a:rPr lang="en-US" smtClean="0"/>
-              <a:t>2/23/21</a:t>
+              <a:t>2/15/22</a:t>
             </a:fld>
             <a:endParaRPr lang="en-US"/>
           </a:p>
@@ -2147,7 +2147,7 @@
           <a:p>
             <a:fld id="{7D5693D1-C5E8-7D40-8B0E-476CF8AD55E4}" type="datetimeFigureOut">
               <a:rPr lang="en-US" smtClean="0"/>
-              <a:t>2/23/21</a:t>
+              <a:t>2/15/22</a:t>
             </a:fld>
             <a:endParaRPr lang="en-US"/>
           </a:p>
@@ -2511,7 +2511,7 @@
           <a:p>
             <a:fld id="{7D5693D1-C5E8-7D40-8B0E-476CF8AD55E4}" type="datetimeFigureOut">
               <a:rPr lang="en-US" smtClean="0"/>
-              <a:t>2/23/21</a:t>
+              <a:t>2/15/22</a:t>
             </a:fld>
             <a:endParaRPr lang="en-US"/>
           </a:p>
@@ -2628,7 +2628,7 @@
           <a:p>
             <a:fld id="{7D5693D1-C5E8-7D40-8B0E-476CF8AD55E4}" type="datetimeFigureOut">
               <a:rPr lang="en-US" smtClean="0"/>
-              <a:t>2/23/21</a:t>
+              <a:t>2/15/22</a:t>
             </a:fld>
             <a:endParaRPr lang="en-US"/>
           </a:p>
@@ -2723,7 +2723,7 @@
           <a:p>
             <a:fld id="{7D5693D1-C5E8-7D40-8B0E-476CF8AD55E4}" type="datetimeFigureOut">
               <a:rPr lang="en-US" smtClean="0"/>
-              <a:t>2/23/21</a:t>
+              <a:t>2/15/22</a:t>
             </a:fld>
             <a:endParaRPr lang="en-US"/>
           </a:p>
@@ -2998,7 +2998,7 @@
           <a:p>
             <a:fld id="{7D5693D1-C5E8-7D40-8B0E-476CF8AD55E4}" type="datetimeFigureOut">
               <a:rPr lang="en-US" smtClean="0"/>
-              <a:t>2/23/21</a:t>
+              <a:t>2/15/22</a:t>
             </a:fld>
             <a:endParaRPr lang="en-US"/>
           </a:p>
@@ -3250,7 +3250,7 @@
           <a:p>
             <a:fld id="{7D5693D1-C5E8-7D40-8B0E-476CF8AD55E4}" type="datetimeFigureOut">
               <a:rPr lang="en-US" smtClean="0"/>
-              <a:t>2/23/21</a:t>
+              <a:t>2/15/22</a:t>
             </a:fld>
             <a:endParaRPr lang="en-US"/>
           </a:p>
@@ -3461,7 +3461,7 @@
           <a:p>
             <a:fld id="{7D5693D1-C5E8-7D40-8B0E-476CF8AD55E4}" type="datetimeFigureOut">
               <a:rPr lang="en-US" smtClean="0"/>
-              <a:t>2/23/21</a:t>
+              <a:t>2/15/22</a:t>
             </a:fld>
             <a:endParaRPr lang="en-US"/>
           </a:p>
@@ -3997,7 +3997,7 @@
           <a:p>
             <a:r>
               <a:rPr lang="en-US" dirty="0"/>
-              <a:t>Compared the observed value of the statistic with a null distribution, generated by interchanging things that should be interchangeable under your null hypothesis</a:t>
+              <a:t>Compare the observed value of the statistic with a null distribution, generated by interchanging things that should be interchangeable under your null hypothesis</a:t>
             </a:r>
           </a:p>
           <a:p>
@@ -4753,8 +4753,13 @@
             </a:r>
             <a:r>
               <a:rPr lang="en-US" sz="2800" dirty="0"/>
-              <a:t>numbers) is equivalent to what transformation?</a:t>
-            </a:r>
+              <a:t>numbers) is equivalent </a:t>
+            </a:r>
+            <a:r>
+              <a:rPr lang="en-US" sz="2800"/>
+              <a:t>to a log transformation</a:t>
+            </a:r>
+            <a:endParaRPr lang="en-US" sz="2800" dirty="0"/>
           </a:p>
           <a:p>
             <a:pPr lvl="1"/>
@@ -5241,7 +5246,41 @@
             <a:pPr lvl="1"/>
             <a:r>
               <a:rPr lang="en-US" dirty="0"/>
-              <a:t>Tues Feb 23</a:t>
+              <a:t>Tues Feb 22</a:t>
+            </a:r>
+            <a:r>
+              <a:rPr lang="en-US" baseline="30000" dirty="0"/>
+              <a:t>nd</a:t>
+            </a:r>
+            <a:r>
+              <a:rPr lang="en-US" dirty="0"/>
+              <a:t>: Distributions; Thursday Feb 24</a:t>
+            </a:r>
+            <a:r>
+              <a:rPr lang="en-US" baseline="30000" dirty="0"/>
+              <a:t>th</a:t>
+            </a:r>
+            <a:r>
+              <a:rPr lang="en-US" dirty="0"/>
+              <a:t> : Practice</a:t>
+            </a:r>
+          </a:p>
+          <a:p>
+            <a:pPr lvl="1"/>
+            <a:r>
+              <a:rPr lang="en-US" dirty="0"/>
+              <a:t>Tuesday March 1st </a:t>
+            </a:r>
+            <a:r>
+              <a:rPr lang="en-US" b="1" dirty="0"/>
+              <a:t>Josef Uyeda – Phylogenies in R</a:t>
+            </a:r>
+          </a:p>
+          <a:p>
+            <a:pPr lvl="1"/>
+            <a:r>
+              <a:rPr lang="en-US" dirty="0"/>
+              <a:t>Thurs March 3</a:t>
             </a:r>
             <a:r>
               <a:rPr lang="en-US" baseline="30000" dirty="0"/>
@@ -5249,7 +5288,69 @@
             </a:r>
             <a:r>
               <a:rPr lang="en-US" dirty="0"/>
-              <a:t>: Distributions; Thursday Feb 25</a:t>
+              <a:t> </a:t>
+            </a:r>
+            <a:r>
+              <a:rPr lang="en-US" b="1" dirty="0"/>
+              <a:t>No class</a:t>
+            </a:r>
+          </a:p>
+          <a:p>
+            <a:pPr lvl="2"/>
+            <a:r>
+              <a:rPr lang="en-US" dirty="0"/>
+              <a:t>Use this time to read:</a:t>
+            </a:r>
+          </a:p>
+          <a:p>
+            <a:pPr lvl="2"/>
+            <a:r>
+              <a:rPr lang="en-US" dirty="0"/>
+              <a:t>1) Chapter on Distributions from Ben </a:t>
+            </a:r>
+            <a:r>
+              <a:rPr lang="en-US" dirty="0" err="1"/>
+              <a:t>Bolkers</a:t>
+            </a:r>
+            <a:r>
+              <a:rPr lang="en-US" dirty="0"/>
+              <a:t> book (posted), corresponds with next weeks lecture</a:t>
+            </a:r>
+          </a:p>
+          <a:p>
+            <a:pPr lvl="2"/>
+            <a:r>
+              <a:rPr lang="en-US" dirty="0"/>
+              <a:t>2) Take quiz (after reading chapter, open book)</a:t>
+            </a:r>
+          </a:p>
+          <a:p>
+            <a:pPr lvl="2"/>
+            <a:r>
+              <a:rPr lang="en-US" dirty="0"/>
+              <a:t>3) Read </a:t>
+            </a:r>
+            <a:r>
+              <a:rPr lang="en-US" dirty="0" err="1"/>
+              <a:t>Felsenstein</a:t>
+            </a:r>
+            <a:r>
+              <a:rPr lang="en-US" dirty="0"/>
+              <a:t> 1985 Am Nat (posted)</a:t>
+            </a:r>
+          </a:p>
+          <a:p>
+            <a:pPr lvl="1"/>
+            <a:r>
+              <a:rPr lang="en-US" dirty="0"/>
+              <a:t>March 8 &amp; 10 – Spring Break, No class</a:t>
+            </a:r>
+          </a:p>
+          <a:p>
+            <a:pPr lvl="1"/>
+            <a:r>
+              <a:rPr lang="en-US" dirty="0"/>
+              <a:t>Tuesday Mar 15</a:t>
             </a:r>
             <a:r>
               <a:rPr lang="en-US" baseline="30000" dirty="0"/>
@@ -5257,137 +5358,18 @@
             </a:r>
             <a:r>
               <a:rPr lang="en-US" dirty="0"/>
-              <a:t> : Spring Break Day</a:t>
+              <a:t>: </a:t>
+            </a:r>
+            <a:r>
+              <a:rPr lang="en-US" b="1" u="sng" dirty="0"/>
+              <a:t>recorded lecture on linear models. Watch on your own.</a:t>
             </a:r>
           </a:p>
           <a:p>
             <a:pPr lvl="1"/>
             <a:r>
               <a:rPr lang="en-US" dirty="0"/>
-              <a:t>Tuesday March 2</a:t>
-            </a:r>
-            <a:r>
-              <a:rPr lang="en-US" baseline="30000" dirty="0"/>
-              <a:t>nd</a:t>
-            </a:r>
-            <a:r>
-              <a:rPr lang="en-US" dirty="0"/>
-              <a:t> </a:t>
-            </a:r>
-            <a:r>
-              <a:rPr lang="en-US" b="1" dirty="0"/>
-              <a:t>class will not be held</a:t>
-            </a:r>
-          </a:p>
-          <a:p>
-            <a:pPr lvl="1"/>
-            <a:r>
-              <a:rPr lang="en-US" dirty="0"/>
-              <a:t>Use this time to read:</a:t>
-            </a:r>
-          </a:p>
-          <a:p>
-            <a:pPr lvl="2"/>
-            <a:r>
-              <a:rPr lang="en-US" dirty="0"/>
-              <a:t>1) Chapter on Distributions from Ben </a:t>
-            </a:r>
-            <a:r>
-              <a:rPr lang="en-US" dirty="0" err="1"/>
-              <a:t>Bolkers</a:t>
-            </a:r>
-            <a:r>
-              <a:rPr lang="en-US" dirty="0"/>
-              <a:t> book (posted)</a:t>
-            </a:r>
-          </a:p>
-          <a:p>
-            <a:pPr lvl="2"/>
-            <a:r>
-              <a:rPr lang="en-US" dirty="0"/>
-              <a:t>2) Take quiz (after reading chapter, open book)</a:t>
-            </a:r>
-          </a:p>
-          <a:p>
-            <a:pPr lvl="2"/>
-            <a:r>
-              <a:rPr lang="en-US" dirty="0"/>
-              <a:t>3) Read </a:t>
-            </a:r>
-            <a:r>
-              <a:rPr lang="en-US" dirty="0" err="1"/>
-              <a:t>Felsenstein</a:t>
-            </a:r>
-            <a:r>
-              <a:rPr lang="en-US" dirty="0"/>
-              <a:t> 1985 Am Nat (posted)</a:t>
-            </a:r>
-          </a:p>
-          <a:p>
-            <a:pPr lvl="1"/>
-            <a:r>
-              <a:rPr lang="en-US" b="1" u="sng" dirty="0"/>
-              <a:t>Thursday Mar 5th class: Dr. Josef Uyeda discussing working with phylogenies in R</a:t>
-            </a:r>
-          </a:p>
-          <a:p>
-            <a:pPr lvl="1"/>
-            <a:r>
-              <a:rPr lang="en-US" dirty="0"/>
-              <a:t>Tuesday Mar 9</a:t>
-            </a:r>
-            <a:r>
-              <a:rPr lang="en-US" baseline="30000" dirty="0"/>
-              <a:t>th</a:t>
-            </a:r>
-            <a:r>
-              <a:rPr lang="en-US" dirty="0"/>
-              <a:t>: recorded lecture, we will </a:t>
-            </a:r>
-            <a:r>
-              <a:rPr lang="en-US" b="1" dirty="0"/>
-              <a:t>not</a:t>
-            </a:r>
-            <a:r>
-              <a:rPr lang="en-US" dirty="0"/>
-              <a:t> meet in person</a:t>
-            </a:r>
-          </a:p>
-          <a:p>
-            <a:pPr lvl="1"/>
-            <a:r>
-              <a:rPr lang="en-US" dirty="0"/>
-              <a:t>Thurs Mar 11</a:t>
-            </a:r>
-            <a:r>
-              <a:rPr lang="en-US" baseline="30000" dirty="0"/>
-              <a:t>th</a:t>
-            </a:r>
-            <a:r>
-              <a:rPr lang="en-US" dirty="0"/>
-              <a:t>: Meet as usual </a:t>
-            </a:r>
-          </a:p>
-          <a:p>
-            <a:pPr lvl="1"/>
-            <a:r>
-              <a:rPr lang="en-US" dirty="0"/>
-              <a:t>Tuesday Mar 16</a:t>
-            </a:r>
-            <a:r>
-              <a:rPr lang="en-US" baseline="30000" dirty="0"/>
-              <a:t>th</a:t>
-            </a:r>
-            <a:r>
-              <a:rPr lang="en-US" dirty="0"/>
-              <a:t>: recorded lecture, will be on for office hours TBA</a:t>
-            </a:r>
-          </a:p>
-          <a:p>
-            <a:pPr lvl="1"/>
-            <a:r>
-              <a:rPr lang="en-US" dirty="0"/>
-              <a:t>Thurs Mar 18</a:t>
+              <a:t>Thurs Mar 17</a:t>
             </a:r>
             <a:r>
               <a:rPr lang="en-US" baseline="30000" dirty="0"/>

</xml_diff>